<commit_message>
Updated "slide 1" chapter list. 	modified:   week05-ch9-15plus-pys.pptx
</commit_message>
<xml_diff>
--- a/week05-ch9-15plus-pys.pptx
+++ b/week05-ch9-15plus-pys.pptx
@@ -3069,7 +3069,19 @@
           <a:p>
             <a:r>
               <a:rPr lang="en-US" dirty="0" smtClean="0"/>
-              <a:t>(week3 CH5 - 8)</a:t>
+              <a:t>(week3 </a:t>
+            </a:r>
+            <a:r>
+              <a:rPr lang="en-US" dirty="0" smtClean="0"/>
+              <a:t>CH9 </a:t>
+            </a:r>
+            <a:r>
+              <a:rPr lang="mr-IN" dirty="0" smtClean="0"/>
+              <a:t>–</a:t>
+            </a:r>
+            <a:r>
+              <a:rPr lang="en-US" dirty="0" smtClean="0"/>
+              <a:t> 15xx)</a:t>
             </a:r>
             <a:endParaRPr lang="en-US" dirty="0"/>
           </a:p>

</xml_diff>

<commit_message>
Updated Python for files examples.
Added slide with list of useful modules.
	modified:   week05-ch9-15plus-pys.pptx
</commit_message>
<xml_diff>
--- a/week05-ch9-15plus-pys.pptx
+++ b/week05-ch9-15plus-pys.pptx
@@ -21,7 +21,10 @@
     <p:sldId id="303" r:id="rId15"/>
     <p:sldId id="304" r:id="rId16"/>
     <p:sldId id="305" r:id="rId17"/>
-    <p:sldId id="306" r:id="rId18"/>
+    <p:sldId id="311" r:id="rId18"/>
+    <p:sldId id="312" r:id="rId19"/>
+    <p:sldId id="313" r:id="rId20"/>
+    <p:sldId id="306" r:id="rId21"/>
   </p:sldIdLst>
   <p:sldSz cx="12192000" cy="6858000"/>
   <p:notesSz cx="6858000" cy="9144000"/>
@@ -157,6 +160,13 @@
             <p14:sldId id="303"/>
             <p14:sldId id="304"/>
             <p14:sldId id="305"/>
+            <p14:sldId id="311"/>
+            <p14:sldId id="312"/>
+          </p14:sldIdLst>
+        </p14:section>
+        <p14:section name="Chapter 15" id="{7258C7B3-E76E-BE4B-BF8A-4F43FDE4A0F6}">
+          <p14:sldIdLst>
+            <p14:sldId id="313"/>
             <p14:sldId id="306"/>
           </p14:sldIdLst>
         </p14:section>
@@ -300,7 +310,7 @@
           <a:p>
             <a:fld id="{9DD2743A-191F-4F4B-BF49-5751DC9A0E55}" type="datetimeFigureOut">
               <a:rPr lang="en-US" smtClean="0"/>
-              <a:t>3/21/17</a:t>
+              <a:t>3/28/17</a:t>
             </a:fld>
             <a:endParaRPr lang="en-US"/>
           </a:p>
@@ -470,7 +480,7 @@
           <a:p>
             <a:fld id="{9DD2743A-191F-4F4B-BF49-5751DC9A0E55}" type="datetimeFigureOut">
               <a:rPr lang="en-US" smtClean="0"/>
-              <a:t>3/21/17</a:t>
+              <a:t>3/28/17</a:t>
             </a:fld>
             <a:endParaRPr lang="en-US"/>
           </a:p>
@@ -650,7 +660,7 @@
           <a:p>
             <a:fld id="{9DD2743A-191F-4F4B-BF49-5751DC9A0E55}" type="datetimeFigureOut">
               <a:rPr lang="en-US" smtClean="0"/>
-              <a:t>3/21/17</a:t>
+              <a:t>3/28/17</a:t>
             </a:fld>
             <a:endParaRPr lang="en-US"/>
           </a:p>
@@ -820,7 +830,7 @@
           <a:p>
             <a:fld id="{9DD2743A-191F-4F4B-BF49-5751DC9A0E55}" type="datetimeFigureOut">
               <a:rPr lang="en-US" smtClean="0"/>
-              <a:t>3/21/17</a:t>
+              <a:t>3/28/17</a:t>
             </a:fld>
             <a:endParaRPr lang="en-US"/>
           </a:p>
@@ -1066,7 +1076,7 @@
           <a:p>
             <a:fld id="{9DD2743A-191F-4F4B-BF49-5751DC9A0E55}" type="datetimeFigureOut">
               <a:rPr lang="en-US" smtClean="0"/>
-              <a:t>3/21/17</a:t>
+              <a:t>3/28/17</a:t>
             </a:fld>
             <a:endParaRPr lang="en-US"/>
           </a:p>
@@ -1298,7 +1308,7 @@
           <a:p>
             <a:fld id="{9DD2743A-191F-4F4B-BF49-5751DC9A0E55}" type="datetimeFigureOut">
               <a:rPr lang="en-US" smtClean="0"/>
-              <a:t>3/21/17</a:t>
+              <a:t>3/28/17</a:t>
             </a:fld>
             <a:endParaRPr lang="en-US"/>
           </a:p>
@@ -1665,7 +1675,7 @@
           <a:p>
             <a:fld id="{9DD2743A-191F-4F4B-BF49-5751DC9A0E55}" type="datetimeFigureOut">
               <a:rPr lang="en-US" smtClean="0"/>
-              <a:t>3/21/17</a:t>
+              <a:t>3/28/17</a:t>
             </a:fld>
             <a:endParaRPr lang="en-US"/>
           </a:p>
@@ -1783,7 +1793,7 @@
           <a:p>
             <a:fld id="{9DD2743A-191F-4F4B-BF49-5751DC9A0E55}" type="datetimeFigureOut">
               <a:rPr lang="en-US" smtClean="0"/>
-              <a:t>3/21/17</a:t>
+              <a:t>3/28/17</a:t>
             </a:fld>
             <a:endParaRPr lang="en-US"/>
           </a:p>
@@ -1878,7 +1888,7 @@
           <a:p>
             <a:fld id="{9DD2743A-191F-4F4B-BF49-5751DC9A0E55}" type="datetimeFigureOut">
               <a:rPr lang="en-US" smtClean="0"/>
-              <a:t>3/21/17</a:t>
+              <a:t>3/28/17</a:t>
             </a:fld>
             <a:endParaRPr lang="en-US"/>
           </a:p>
@@ -2155,7 +2165,7 @@
           <a:p>
             <a:fld id="{9DD2743A-191F-4F4B-BF49-5751DC9A0E55}" type="datetimeFigureOut">
               <a:rPr lang="en-US" smtClean="0"/>
-              <a:t>3/21/17</a:t>
+              <a:t>3/28/17</a:t>
             </a:fld>
             <a:endParaRPr lang="en-US"/>
           </a:p>
@@ -2408,7 +2418,7 @@
           <a:p>
             <a:fld id="{9DD2743A-191F-4F4B-BF49-5751DC9A0E55}" type="datetimeFigureOut">
               <a:rPr lang="en-US" smtClean="0"/>
-              <a:t>3/21/17</a:t>
+              <a:t>3/28/17</a:t>
             </a:fld>
             <a:endParaRPr lang="en-US"/>
           </a:p>
@@ -2621,7 +2631,7 @@
           <a:p>
             <a:fld id="{9DD2743A-191F-4F4B-BF49-5751DC9A0E55}" type="datetimeFigureOut">
               <a:rPr lang="en-US" smtClean="0"/>
-              <a:t>3/21/17</a:t>
+              <a:t>3/28/17</a:t>
             </a:fld>
             <a:endParaRPr lang="en-US"/>
           </a:p>
@@ -3069,11 +3079,7 @@
           <a:p>
             <a:r>
               <a:rPr lang="en-US" dirty="0" smtClean="0"/>
-              <a:t>(week3 </a:t>
-            </a:r>
-            <a:r>
-              <a:rPr lang="en-US" dirty="0" smtClean="0"/>
-              <a:t>CH9 </a:t>
+              <a:t>(week3 CH9 </a:t>
             </a:r>
             <a:r>
               <a:rPr lang="mr-IN" dirty="0" smtClean="0"/>
@@ -3750,7 +3756,7 @@
           <a:p>
             <a:r>
               <a:rPr lang="en-US" dirty="0" smtClean="0"/>
-              <a:t>Stop Here for today</a:t>
+              <a:t>Files and persistence</a:t>
             </a:r>
             <a:endParaRPr lang="en-US" dirty="0"/>
           </a:p>
@@ -3771,7 +3777,34 @@
           <a:bodyPr/>
           <a:lstStyle/>
           <a:p>
-            <a:endParaRPr lang="en-US"/>
+            <a:r>
+              <a:rPr lang="en-US" dirty="0" smtClean="0"/>
+              <a:t>Persistent programs store their data or run for a long time</a:t>
+            </a:r>
+          </a:p>
+          <a:p>
+            <a:pPr lvl="1"/>
+            <a:r>
+              <a:rPr lang="en-US" dirty="0" smtClean="0"/>
+              <a:t>Simplest way to store data is to write a file (</a:t>
+            </a:r>
+            <a:r>
+              <a:rPr lang="en-US" dirty="0" err="1" smtClean="0"/>
+              <a:t>eg</a:t>
+            </a:r>
+            <a:r>
+              <a:rPr lang="en-US" dirty="0" smtClean="0"/>
+              <a:t>. </a:t>
+            </a:r>
+            <a:r>
+              <a:rPr lang="en-US" dirty="0"/>
+              <a:t>o</a:t>
+            </a:r>
+            <a:r>
+              <a:rPr lang="en-US" dirty="0" smtClean="0"/>
+              <a:t>utput to the disk)</a:t>
+            </a:r>
+            <a:endParaRPr lang="en-US" dirty="0"/>
           </a:p>
         </p:txBody>
       </p:sp>
@@ -3841,7 +3874,7 @@
         <p:spPr/>
         <p:txBody>
           <a:bodyPr>
-            <a:normAutofit fontScale="92500" lnSpcReduction="20000"/>
+            <a:normAutofit fontScale="92500" lnSpcReduction="10000"/>
           </a:bodyPr>
           <a:lstStyle/>
           <a:p>
@@ -3888,11 +3921,25 @@
               <a:t>&gt;&gt;&gt; print </a:t>
             </a:r>
             <a:r>
-              <a:rPr lang="en-US" dirty="0" err="1">
+              <a:rPr lang="en-US" dirty="0" smtClean="0">
+                <a:latin typeface="Times New Roman" panose="02020603050405020304" pitchFamily="18" charset="0"/>
+                <a:cs typeface="Times New Roman" panose="02020603050405020304" pitchFamily="18" charset="0"/>
+              </a:rPr>
+              <a:t>(</a:t>
+            </a:r>
+            <a:r>
+              <a:rPr lang="en-US" dirty="0" err="1" smtClean="0">
                 <a:latin typeface="Times New Roman" panose="02020603050405020304" pitchFamily="18" charset="0"/>
                 <a:cs typeface="Times New Roman" panose="02020603050405020304" pitchFamily="18" charset="0"/>
               </a:rPr>
               <a:t>fout</a:t>
+            </a:r>
+            <a:r>
+              <a:rPr lang="en-US" dirty="0" smtClean="0">
+                <a:latin typeface="Times New Roman" panose="02020603050405020304" pitchFamily="18" charset="0"/>
+                <a:cs typeface="Times New Roman" panose="02020603050405020304" pitchFamily="18" charset="0"/>
+              </a:rPr>
+              <a:t>)</a:t>
             </a:r>
             <a:endParaRPr lang="en-US" dirty="0">
               <a:latin typeface="Times New Roman" panose="02020603050405020304" pitchFamily="18" charset="0"/>
@@ -3908,20 +3955,55 @@
                 <a:latin typeface="Times New Roman" panose="02020603050405020304" pitchFamily="18" charset="0"/>
                 <a:cs typeface="Times New Roman" panose="02020603050405020304" pitchFamily="18" charset="0"/>
               </a:rPr>
-              <a:t>&lt;open file 'output.txt', mode 'w' at 0xb7eb2410</a:t>
+              <a:t>&lt;_</a:t>
+            </a:r>
+            <a:r>
+              <a:rPr lang="en-US" dirty="0" err="1">
+                <a:latin typeface="Times New Roman" panose="02020603050405020304" pitchFamily="18" charset="0"/>
+                <a:cs typeface="Times New Roman" panose="02020603050405020304" pitchFamily="18" charset="0"/>
+              </a:rPr>
+              <a:t>io.TextIOWrapper</a:t>
+            </a:r>
+            <a:r>
+              <a:rPr lang="en-US" dirty="0">
+                <a:latin typeface="Times New Roman" panose="02020603050405020304" pitchFamily="18" charset="0"/>
+                <a:cs typeface="Times New Roman" panose="02020603050405020304" pitchFamily="18" charset="0"/>
+              </a:rPr>
+              <a:t> name='</a:t>
+            </a:r>
+            <a:r>
+              <a:rPr lang="en-US" dirty="0" err="1">
+                <a:latin typeface="Times New Roman" panose="02020603050405020304" pitchFamily="18" charset="0"/>
+                <a:cs typeface="Times New Roman" panose="02020603050405020304" pitchFamily="18" charset="0"/>
+              </a:rPr>
+              <a:t>output.txt</a:t>
+            </a:r>
+            <a:r>
+              <a:rPr lang="en-US" dirty="0">
+                <a:latin typeface="Times New Roman" panose="02020603050405020304" pitchFamily="18" charset="0"/>
+                <a:cs typeface="Times New Roman" panose="02020603050405020304" pitchFamily="18" charset="0"/>
+              </a:rPr>
+              <a:t>' mode='w' encoding='US-ASCII</a:t>
             </a:r>
             <a:r>
               <a:rPr lang="en-US" dirty="0" smtClean="0">
                 <a:latin typeface="Times New Roman" panose="02020603050405020304" pitchFamily="18" charset="0"/>
                 <a:cs typeface="Times New Roman" panose="02020603050405020304" pitchFamily="18" charset="0"/>
               </a:rPr>
-              <a:t>&gt;</a:t>
-            </a:r>
-          </a:p>
-          <a:p>
+              <a:t>'&gt;</a:t>
+            </a:r>
+          </a:p>
+          <a:p>
+            <a:pPr marL="457200" lvl="1" indent="0">
+              <a:buNone/>
+            </a:pPr>
+            <a:r>
+              <a:rPr lang="en-US" dirty="0" smtClean="0"/>
+              <a:t>The </a:t>
+            </a:r>
             <a:r>
               <a:rPr lang="en-US" dirty="0"/>
-              <a:t>The write method puts data into the file.</a:t>
+              <a:t>write method puts data into the file.</a:t>
             </a:r>
           </a:p>
           <a:p>
@@ -4109,7 +4191,11 @@
           <a:p>
             <a:r>
               <a:rPr lang="en-US" dirty="0" smtClean="0"/>
-              <a:t>Files (read files)</a:t>
+              <a:t>Files (read </a:t>
+            </a:r>
+            <a:r>
+              <a:rPr lang="en-US" dirty="0" smtClean="0"/>
+              <a:t>files // using a pipe)</a:t>
             </a:r>
             <a:endParaRPr lang="en-US" dirty="0"/>
           </a:p>
@@ -4546,7 +4632,14 @@
                 <a:latin typeface="Times New Roman" panose="02020603050405020304" pitchFamily="18" charset="0"/>
                 <a:cs typeface="Times New Roman" panose="02020603050405020304" pitchFamily="18" charset="0"/>
               </a:rPr>
-              <a:t>&gt;&gt;&gt; print </a:t>
+              <a:t>&gt;&gt;&gt; </a:t>
+            </a:r>
+            <a:r>
+              <a:rPr lang="en-US" sz="1600" dirty="0" smtClean="0">
+                <a:latin typeface="Times New Roman" panose="02020603050405020304" pitchFamily="18" charset="0"/>
+                <a:cs typeface="Times New Roman" panose="02020603050405020304" pitchFamily="18" charset="0"/>
+              </a:rPr>
+              <a:t>print(</a:t>
             </a:r>
             <a:r>
               <a:rPr lang="en-US" sz="1600" dirty="0" err="1" smtClean="0">
@@ -4554,6 +4647,13 @@
                 <a:cs typeface="Times New Roman" panose="02020603050405020304" pitchFamily="18" charset="0"/>
               </a:rPr>
               <a:t>read_data</a:t>
+            </a:r>
+            <a:r>
+              <a:rPr lang="en-US" sz="1600" dirty="0" smtClean="0">
+                <a:latin typeface="Times New Roman" panose="02020603050405020304" pitchFamily="18" charset="0"/>
+                <a:cs typeface="Times New Roman" panose="02020603050405020304" pitchFamily="18" charset="0"/>
+              </a:rPr>
+              <a:t>)</a:t>
             </a:r>
             <a:endParaRPr lang="en-US" sz="1600" dirty="0" smtClean="0">
               <a:latin typeface="Times New Roman" panose="02020603050405020304" pitchFamily="18" charset="0"/>
@@ -4849,26 +4949,14 @@
                 <a:latin typeface="Times New Roman" panose="02020603050405020304" pitchFamily="18" charset="0"/>
                 <a:cs typeface="Times New Roman" panose="02020603050405020304" pitchFamily="18" charset="0"/>
               </a:rPr>
-              <a:t>&gt;&gt;&gt; print res</a:t>
-            </a:r>
-          </a:p>
-          <a:p>
-            <a:pPr marL="914400" lvl="2" indent="0">
-              <a:buNone/>
-            </a:pPr>
-            <a:r>
-              <a:rPr lang="en-US" sz="1400" dirty="0">
-                <a:latin typeface="Times New Roman" panose="02020603050405020304" pitchFamily="18" charset="0"/>
-                <a:cs typeface="Times New Roman" panose="02020603050405020304" pitchFamily="18" charset="0"/>
-              </a:rPr>
-              <a:t>1e0033f0ed0656636de0d75144ba32e0 </a:t>
-            </a:r>
-            <a:r>
-              <a:rPr lang="en-US" sz="1400" dirty="0" err="1">
-                <a:latin typeface="Times New Roman" panose="02020603050405020304" pitchFamily="18" charset="0"/>
-                <a:cs typeface="Times New Roman" panose="02020603050405020304" pitchFamily="18" charset="0"/>
-              </a:rPr>
-              <a:t>book.tex</a:t>
+              <a:t>&gt;&gt;&gt; </a:t>
+            </a:r>
+            <a:r>
+              <a:rPr lang="en-US" sz="1400" dirty="0" smtClean="0">
+                <a:latin typeface="Times New Roman" panose="02020603050405020304" pitchFamily="18" charset="0"/>
+                <a:cs typeface="Times New Roman" panose="02020603050405020304" pitchFamily="18" charset="0"/>
+              </a:rPr>
+              <a:t>print(res)</a:t>
             </a:r>
             <a:endParaRPr lang="en-US" sz="1400" dirty="0">
               <a:latin typeface="Times New Roman" panose="02020603050405020304" pitchFamily="18" charset="0"/>
@@ -4884,6 +4972,29 @@
                 <a:latin typeface="Times New Roman" panose="02020603050405020304" pitchFamily="18" charset="0"/>
                 <a:cs typeface="Times New Roman" panose="02020603050405020304" pitchFamily="18" charset="0"/>
               </a:rPr>
+              <a:t>1e0033f0ed0656636de0d75144ba32e0 </a:t>
+            </a:r>
+            <a:r>
+              <a:rPr lang="en-US" sz="1400" dirty="0" err="1">
+                <a:latin typeface="Times New Roman" panose="02020603050405020304" pitchFamily="18" charset="0"/>
+                <a:cs typeface="Times New Roman" panose="02020603050405020304" pitchFamily="18" charset="0"/>
+              </a:rPr>
+              <a:t>book.tex</a:t>
+            </a:r>
+            <a:endParaRPr lang="en-US" sz="1400" dirty="0">
+              <a:latin typeface="Times New Roman" panose="02020603050405020304" pitchFamily="18" charset="0"/>
+              <a:cs typeface="Times New Roman" panose="02020603050405020304" pitchFamily="18" charset="0"/>
+            </a:endParaRPr>
+          </a:p>
+          <a:p>
+            <a:pPr marL="914400" lvl="2" indent="0">
+              <a:buNone/>
+            </a:pPr>
+            <a:r>
+              <a:rPr lang="en-US" sz="1400" dirty="0">
+                <a:latin typeface="Times New Roman" panose="02020603050405020304" pitchFamily="18" charset="0"/>
+                <a:cs typeface="Times New Roman" panose="02020603050405020304" pitchFamily="18" charset="0"/>
+              </a:rPr>
               <a:t>&gt;&gt;&gt; print </a:t>
             </a:r>
             <a:r>
@@ -4891,8 +5002,12 @@
                 <a:latin typeface="Times New Roman" panose="02020603050405020304" pitchFamily="18" charset="0"/>
                 <a:cs typeface="Times New Roman" panose="02020603050405020304" pitchFamily="18" charset="0"/>
               </a:rPr>
-              <a:t>stat</a:t>
-            </a:r>
+              <a:t>(stat)</a:t>
+            </a:r>
+            <a:endParaRPr lang="en-US" sz="1400" dirty="0" smtClean="0">
+              <a:latin typeface="Times New Roman" panose="02020603050405020304" pitchFamily="18" charset="0"/>
+              <a:cs typeface="Times New Roman" panose="02020603050405020304" pitchFamily="18" charset="0"/>
+            </a:endParaRPr>
           </a:p>
           <a:p>
             <a:endParaRPr lang="en-US" sz="800" dirty="0" smtClean="0">
@@ -5007,6 +5122,571 @@
           <a:p>
             <a:r>
               <a:rPr lang="en-US" dirty="0" smtClean="0"/>
+              <a:t>On our own (some additional modules)</a:t>
+            </a:r>
+            <a:endParaRPr lang="en-US" dirty="0"/>
+          </a:p>
+        </p:txBody>
+      </p:sp>
+      <p:sp>
+        <p:nvSpPr>
+          <p:cNvPr id="3" name="Content Placeholder 2"/>
+          <p:cNvSpPr>
+            <a:spLocks noGrp="1"/>
+          </p:cNvSpPr>
+          <p:nvPr>
+            <p:ph idx="1"/>
+          </p:nvPr>
+        </p:nvSpPr>
+        <p:spPr/>
+        <p:txBody>
+          <a:bodyPr>
+            <a:normAutofit fontScale="92500" lnSpcReduction="10000"/>
+          </a:bodyPr>
+          <a:lstStyle/>
+          <a:p>
+            <a:r>
+              <a:rPr lang="en-US" dirty="0">
+                <a:solidFill>
+                  <a:srgbClr val="FF0000"/>
+                </a:solidFill>
+              </a:rPr>
+              <a:t>p</a:t>
+            </a:r>
+            <a:r>
+              <a:rPr lang="en-US" dirty="0" smtClean="0">
+                <a:solidFill>
+                  <a:srgbClr val="FF0000"/>
+                </a:solidFill>
+              </a:rPr>
+              <a:t>ickle</a:t>
+            </a:r>
+            <a:r>
+              <a:rPr lang="en-US" dirty="0" smtClean="0"/>
+              <a:t> module</a:t>
+            </a:r>
+          </a:p>
+          <a:p>
+            <a:pPr lvl="1"/>
+            <a:r>
+              <a:rPr lang="en-US" dirty="0" smtClean="0"/>
+              <a:t>Used to any type of object data as a string</a:t>
+            </a:r>
+          </a:p>
+          <a:p>
+            <a:pPr lvl="1"/>
+            <a:r>
+              <a:rPr lang="en-US" dirty="0" smtClean="0"/>
+              <a:t>Must use the module to load and write the data</a:t>
+            </a:r>
+          </a:p>
+          <a:p>
+            <a:r>
+              <a:rPr lang="en-US" dirty="0" err="1" smtClean="0">
+                <a:solidFill>
+                  <a:srgbClr val="FF0000"/>
+                </a:solidFill>
+              </a:rPr>
+              <a:t>dbm</a:t>
+            </a:r>
+            <a:r>
+              <a:rPr lang="en-US" dirty="0" smtClean="0">
+                <a:solidFill>
+                  <a:srgbClr val="FF0000"/>
+                </a:solidFill>
+              </a:rPr>
+              <a:t> </a:t>
+            </a:r>
+            <a:r>
+              <a:rPr lang="en-US" dirty="0" smtClean="0"/>
+              <a:t>module</a:t>
+            </a:r>
+          </a:p>
+          <a:p>
+            <a:pPr lvl="1"/>
+            <a:r>
+              <a:rPr lang="en-US" dirty="0" smtClean="0"/>
+              <a:t>A “traditional” database is used to store organized data</a:t>
+            </a:r>
+          </a:p>
+          <a:p>
+            <a:pPr lvl="1"/>
+            <a:r>
+              <a:rPr lang="en-US" dirty="0" smtClean="0"/>
+              <a:t>The </a:t>
+            </a:r>
+            <a:r>
+              <a:rPr lang="en-US" dirty="0" err="1" smtClean="0"/>
+              <a:t>dbm</a:t>
+            </a:r>
+            <a:r>
+              <a:rPr lang="en-US" dirty="0" smtClean="0"/>
+              <a:t> module is used to read and write data</a:t>
+            </a:r>
+          </a:p>
+          <a:p>
+            <a:r>
+              <a:rPr lang="en-US" dirty="0" smtClean="0">
+                <a:solidFill>
+                  <a:srgbClr val="FF0000"/>
+                </a:solidFill>
+              </a:rPr>
+              <a:t>Try / Except</a:t>
+            </a:r>
+          </a:p>
+          <a:p>
+            <a:pPr lvl="1"/>
+            <a:r>
+              <a:rPr lang="en-US" dirty="0" smtClean="0"/>
+              <a:t>A python construct used to catch errors and handle exceptions (to errors)</a:t>
+            </a:r>
+          </a:p>
+          <a:p>
+            <a:r>
+              <a:rPr lang="en-US" dirty="0" err="1" smtClean="0">
+                <a:solidFill>
+                  <a:srgbClr val="FF0000"/>
+                </a:solidFill>
+              </a:rPr>
+              <a:t>os.pipe</a:t>
+            </a:r>
+            <a:r>
+              <a:rPr lang="en-US" dirty="0" smtClean="0">
+                <a:solidFill>
+                  <a:srgbClr val="FF0000"/>
+                </a:solidFill>
+              </a:rPr>
+              <a:t> </a:t>
+            </a:r>
+            <a:r>
+              <a:rPr lang="en-US" dirty="0" smtClean="0"/>
+              <a:t>module</a:t>
+            </a:r>
+          </a:p>
+          <a:p>
+            <a:pPr lvl="1"/>
+            <a:r>
+              <a:rPr lang="en-US" dirty="0" smtClean="0"/>
+              <a:t>Used to read from a program </a:t>
+            </a:r>
+            <a:r>
+              <a:rPr lang="en-US" dirty="0" err="1" smtClean="0"/>
+              <a:t>opend</a:t>
+            </a:r>
+            <a:r>
+              <a:rPr lang="en-US" dirty="0" smtClean="0"/>
+              <a:t> from the shell</a:t>
+            </a:r>
+          </a:p>
+          <a:p>
+            <a:r>
+              <a:rPr lang="en-US" dirty="0" smtClean="0">
+                <a:solidFill>
+                  <a:srgbClr val="FF0000"/>
+                </a:solidFill>
+              </a:rPr>
+              <a:t>Any file which contains python code can be imported as a module</a:t>
+            </a:r>
+            <a:r>
+              <a:rPr lang="en-US" dirty="0" smtClean="0"/>
+              <a:t> (pg. 172)</a:t>
+            </a:r>
+          </a:p>
+          <a:p>
+            <a:pPr lvl="1"/>
+            <a:endParaRPr lang="en-US" dirty="0" smtClean="0"/>
+          </a:p>
+          <a:p>
+            <a:pPr lvl="1"/>
+            <a:endParaRPr lang="en-US" dirty="0"/>
+          </a:p>
+        </p:txBody>
+      </p:sp>
+    </p:spTree>
+    <p:extLst>
+      <p:ext uri="{BB962C8B-B14F-4D97-AF65-F5344CB8AC3E}">
+        <p14:creationId xmlns:p14="http://schemas.microsoft.com/office/powerpoint/2010/main" val="305490932"/>
+      </p:ext>
+    </p:extLst>
+  </p:cSld>
+  <p:clrMapOvr>
+    <a:masterClrMapping/>
+  </p:clrMapOvr>
+</p:sld>
+</file>
+
+<file path=ppt/slides/slide18.xml><?xml version="1.0" encoding="utf-8"?>
+<p:sld xmlns:a="http://schemas.openxmlformats.org/drawingml/2006/main" xmlns:r="http://schemas.openxmlformats.org/officeDocument/2006/relationships" xmlns:p="http://schemas.openxmlformats.org/presentationml/2006/main">
+  <p:cSld>
+    <p:spTree>
+      <p:nvGrpSpPr>
+        <p:cNvPr id="1" name=""/>
+        <p:cNvGrpSpPr/>
+        <p:nvPr/>
+      </p:nvGrpSpPr>
+      <p:grpSpPr>
+        <a:xfrm>
+          <a:off x="0" y="0"/>
+          <a:ext cx="0" cy="0"/>
+          <a:chOff x="0" y="0"/>
+          <a:chExt cx="0" cy="0"/>
+        </a:xfrm>
+      </p:grpSpPr>
+      <p:sp>
+        <p:nvSpPr>
+          <p:cNvPr id="2" name="Title 1"/>
+          <p:cNvSpPr>
+            <a:spLocks noGrp="1"/>
+          </p:cNvSpPr>
+          <p:nvPr>
+            <p:ph type="title"/>
+          </p:nvPr>
+        </p:nvSpPr>
+        <p:spPr/>
+        <p:txBody>
+          <a:bodyPr/>
+          <a:lstStyle/>
+          <a:p>
+            <a:r>
+              <a:rPr lang="en-US" dirty="0" smtClean="0"/>
+              <a:t>Useful filenames and path modules</a:t>
+            </a:r>
+            <a:endParaRPr lang="en-US" dirty="0"/>
+          </a:p>
+        </p:txBody>
+      </p:sp>
+      <p:sp>
+        <p:nvSpPr>
+          <p:cNvPr id="3" name="Content Placeholder 2"/>
+          <p:cNvSpPr>
+            <a:spLocks noGrp="1"/>
+          </p:cNvSpPr>
+          <p:nvPr>
+            <p:ph idx="1"/>
+          </p:nvPr>
+        </p:nvSpPr>
+        <p:spPr/>
+        <p:txBody>
+          <a:bodyPr/>
+          <a:lstStyle/>
+          <a:p>
+            <a:r>
+              <a:rPr lang="en-US" dirty="0" err="1" smtClean="0"/>
+              <a:t>os.path.abspath</a:t>
+            </a:r>
+            <a:r>
+              <a:rPr lang="en-US" dirty="0" smtClean="0"/>
+              <a:t> </a:t>
+            </a:r>
+            <a:r>
+              <a:rPr lang="mr-IN" dirty="0" smtClean="0"/>
+              <a:t>–</a:t>
+            </a:r>
+            <a:r>
+              <a:rPr lang="en-US" dirty="0" smtClean="0"/>
+              <a:t> absolute paths</a:t>
+            </a:r>
+          </a:p>
+          <a:p>
+            <a:r>
+              <a:rPr lang="en-US" dirty="0" err="1" smtClean="0"/>
+              <a:t>os.path.exists</a:t>
+            </a:r>
+            <a:r>
+              <a:rPr lang="en-US" dirty="0" smtClean="0"/>
+              <a:t> </a:t>
+            </a:r>
+            <a:r>
+              <a:rPr lang="mr-IN" dirty="0" smtClean="0"/>
+              <a:t>–</a:t>
+            </a:r>
+            <a:r>
+              <a:rPr lang="en-US" dirty="0" smtClean="0"/>
+              <a:t> does path exist?</a:t>
+            </a:r>
+          </a:p>
+          <a:p>
+            <a:r>
+              <a:rPr lang="en-US" dirty="0" err="1" smtClean="0"/>
+              <a:t>os.path.isdir</a:t>
+            </a:r>
+            <a:r>
+              <a:rPr lang="en-US" dirty="0" smtClean="0"/>
+              <a:t> </a:t>
+            </a:r>
+            <a:r>
+              <a:rPr lang="mr-IN" dirty="0" smtClean="0"/>
+              <a:t>–</a:t>
+            </a:r>
+            <a:r>
+              <a:rPr lang="en-US" dirty="0" smtClean="0"/>
+              <a:t> is path a directory</a:t>
+            </a:r>
+          </a:p>
+          <a:p>
+            <a:r>
+              <a:rPr lang="en-US" dirty="0" err="1" smtClean="0"/>
+              <a:t>os.listdir</a:t>
+            </a:r>
+            <a:r>
+              <a:rPr lang="en-US" dirty="0" smtClean="0"/>
+              <a:t> </a:t>
+            </a:r>
+            <a:r>
+              <a:rPr lang="mr-IN" dirty="0" smtClean="0"/>
+              <a:t>–</a:t>
+            </a:r>
+            <a:r>
+              <a:rPr lang="en-US" dirty="0" smtClean="0"/>
+              <a:t> list the path that is a directory</a:t>
+            </a:r>
+          </a:p>
+          <a:p>
+            <a:r>
+              <a:rPr lang="en-US" dirty="0" err="1" smtClean="0"/>
+              <a:t>os.pathisfile</a:t>
+            </a:r>
+            <a:r>
+              <a:rPr lang="en-US" dirty="0" smtClean="0"/>
+              <a:t> </a:t>
+            </a:r>
+            <a:r>
+              <a:rPr lang="mr-IN" dirty="0" smtClean="0"/>
+              <a:t>–</a:t>
+            </a:r>
+            <a:r>
+              <a:rPr lang="en-US" dirty="0" smtClean="0"/>
+              <a:t> is this a file?</a:t>
+            </a:r>
+          </a:p>
+          <a:p>
+            <a:pPr lvl="1"/>
+            <a:endParaRPr lang="en-US" dirty="0" smtClean="0"/>
+          </a:p>
+          <a:p>
+            <a:pPr lvl="1"/>
+            <a:r>
+              <a:rPr lang="en-US" sz="1800" i="1" dirty="0" smtClean="0"/>
+              <a:t>See try / except construct for an easier way (pg. 169)</a:t>
+            </a:r>
+          </a:p>
+          <a:p>
+            <a:endParaRPr lang="en-US" dirty="0"/>
+          </a:p>
+        </p:txBody>
+      </p:sp>
+    </p:spTree>
+    <p:extLst>
+      <p:ext uri="{BB962C8B-B14F-4D97-AF65-F5344CB8AC3E}">
+        <p14:creationId xmlns:p14="http://schemas.microsoft.com/office/powerpoint/2010/main" val="1793782158"/>
+      </p:ext>
+    </p:extLst>
+  </p:cSld>
+  <p:clrMapOvr>
+    <a:masterClrMapping/>
+  </p:clrMapOvr>
+</p:sld>
+</file>
+
+<file path=ppt/slides/slide19.xml><?xml version="1.0" encoding="utf-8"?>
+<p:sld xmlns:a="http://schemas.openxmlformats.org/drawingml/2006/main" xmlns:r="http://schemas.openxmlformats.org/officeDocument/2006/relationships" xmlns:p="http://schemas.openxmlformats.org/presentationml/2006/main">
+  <p:cSld>
+    <p:spTree>
+      <p:nvGrpSpPr>
+        <p:cNvPr id="1" name=""/>
+        <p:cNvGrpSpPr/>
+        <p:nvPr/>
+      </p:nvGrpSpPr>
+      <p:grpSpPr>
+        <a:xfrm>
+          <a:off x="0" y="0"/>
+          <a:ext cx="0" cy="0"/>
+          <a:chOff x="0" y="0"/>
+          <a:chExt cx="0" cy="0"/>
+        </a:xfrm>
+      </p:grpSpPr>
+      <p:sp>
+        <p:nvSpPr>
+          <p:cNvPr id="2" name="Title 1"/>
+          <p:cNvSpPr>
+            <a:spLocks noGrp="1"/>
+          </p:cNvSpPr>
+          <p:nvPr>
+            <p:ph type="title"/>
+          </p:nvPr>
+        </p:nvSpPr>
+        <p:spPr/>
+        <p:txBody>
+          <a:bodyPr/>
+          <a:lstStyle/>
+          <a:p>
+            <a:r>
+              <a:rPr lang="en-US" dirty="0" smtClean="0"/>
+              <a:t>Stop here for today</a:t>
+            </a:r>
+            <a:endParaRPr lang="en-US" dirty="0"/>
+          </a:p>
+        </p:txBody>
+      </p:sp>
+      <p:sp>
+        <p:nvSpPr>
+          <p:cNvPr id="3" name="Content Placeholder 2"/>
+          <p:cNvSpPr>
+            <a:spLocks noGrp="1"/>
+          </p:cNvSpPr>
+          <p:nvPr>
+            <p:ph idx="1"/>
+          </p:nvPr>
+        </p:nvSpPr>
+        <p:spPr/>
+        <p:txBody>
+          <a:bodyPr/>
+          <a:lstStyle/>
+          <a:p>
+            <a:r>
+              <a:rPr lang="en-US" dirty="0" smtClean="0"/>
+              <a:t>Really. Stop here for today.</a:t>
+            </a:r>
+            <a:endParaRPr lang="en-US" dirty="0"/>
+          </a:p>
+        </p:txBody>
+      </p:sp>
+    </p:spTree>
+    <p:extLst>
+      <p:ext uri="{BB962C8B-B14F-4D97-AF65-F5344CB8AC3E}">
+        <p14:creationId xmlns:p14="http://schemas.microsoft.com/office/powerpoint/2010/main" val="1371457186"/>
+      </p:ext>
+    </p:extLst>
+  </p:cSld>
+  <p:clrMapOvr>
+    <a:masterClrMapping/>
+  </p:clrMapOvr>
+</p:sld>
+</file>
+
+<file path=ppt/slides/slide2.xml><?xml version="1.0" encoding="utf-8"?>
+<p:sld xmlns:a="http://schemas.openxmlformats.org/drawingml/2006/main" xmlns:r="http://schemas.openxmlformats.org/officeDocument/2006/relationships" xmlns:p="http://schemas.openxmlformats.org/presentationml/2006/main">
+  <p:cSld>
+    <p:spTree>
+      <p:nvGrpSpPr>
+        <p:cNvPr id="1" name=""/>
+        <p:cNvGrpSpPr/>
+        <p:nvPr/>
+      </p:nvGrpSpPr>
+      <p:grpSpPr>
+        <a:xfrm>
+          <a:off x="0" y="0"/>
+          <a:ext cx="0" cy="0"/>
+          <a:chOff x="0" y="0"/>
+          <a:chExt cx="0" cy="0"/>
+        </a:xfrm>
+      </p:grpSpPr>
+      <p:sp>
+        <p:nvSpPr>
+          <p:cNvPr id="2" name="Title 1"/>
+          <p:cNvSpPr>
+            <a:spLocks noGrp="1"/>
+          </p:cNvSpPr>
+          <p:nvPr>
+            <p:ph type="title"/>
+          </p:nvPr>
+        </p:nvSpPr>
+        <p:spPr/>
+        <p:txBody>
+          <a:bodyPr/>
+          <a:lstStyle/>
+          <a:p>
+            <a:r>
+              <a:rPr lang="en-US" dirty="0" smtClean="0"/>
+              <a:t>Begin Chapter 9</a:t>
+            </a:r>
+            <a:endParaRPr lang="en-US" dirty="0"/>
+          </a:p>
+        </p:txBody>
+      </p:sp>
+      <p:sp>
+        <p:nvSpPr>
+          <p:cNvPr id="3" name="Content Placeholder 2"/>
+          <p:cNvSpPr>
+            <a:spLocks noGrp="1"/>
+          </p:cNvSpPr>
+          <p:nvPr>
+            <p:ph idx="1"/>
+          </p:nvPr>
+        </p:nvSpPr>
+        <p:spPr/>
+        <p:txBody>
+          <a:bodyPr/>
+          <a:lstStyle/>
+          <a:p>
+            <a:pPr marL="0" marR="0" lvl="0" indent="0" defTabSz="914400" eaLnBrk="1" fontAlgn="auto" latinLnBrk="0" hangingPunct="1">
+              <a:lnSpc>
+                <a:spcPct val="100000"/>
+              </a:lnSpc>
+              <a:spcBef>
+                <a:spcPts val="0"/>
+              </a:spcBef>
+              <a:spcAft>
+                <a:spcPts val="0"/>
+              </a:spcAft>
+              <a:buClrTx/>
+              <a:buSzTx/>
+              <a:buFontTx/>
+              <a:buNone/>
+              <a:tabLst/>
+              <a:defRPr/>
+            </a:pPr>
+            <a:endParaRPr lang="en-US" dirty="0"/>
+          </a:p>
+        </p:txBody>
+      </p:sp>
+    </p:spTree>
+    <p:extLst>
+      <p:ext uri="{BB962C8B-B14F-4D97-AF65-F5344CB8AC3E}">
+        <p14:creationId xmlns:p14="http://schemas.microsoft.com/office/powerpoint/2010/main" val="1865869954"/>
+      </p:ext>
+    </p:extLst>
+  </p:cSld>
+  <p:clrMapOvr>
+    <a:masterClrMapping/>
+  </p:clrMapOvr>
+</p:sld>
+</file>
+
+<file path=ppt/slides/slide20.xml><?xml version="1.0" encoding="utf-8"?>
+<p:sld xmlns:a="http://schemas.openxmlformats.org/drawingml/2006/main" xmlns:r="http://schemas.openxmlformats.org/officeDocument/2006/relationships" xmlns:p="http://schemas.openxmlformats.org/presentationml/2006/main">
+  <p:cSld>
+    <p:spTree>
+      <p:nvGrpSpPr>
+        <p:cNvPr id="1" name=""/>
+        <p:cNvGrpSpPr/>
+        <p:nvPr/>
+      </p:nvGrpSpPr>
+      <p:grpSpPr>
+        <a:xfrm>
+          <a:off x="0" y="0"/>
+          <a:ext cx="0" cy="0"/>
+          <a:chOff x="0" y="0"/>
+          <a:chExt cx="0" cy="0"/>
+        </a:xfrm>
+      </p:grpSpPr>
+      <p:sp>
+        <p:nvSpPr>
+          <p:cNvPr id="2" name="Title 1"/>
+          <p:cNvSpPr>
+            <a:spLocks noGrp="1"/>
+          </p:cNvSpPr>
+          <p:nvPr>
+            <p:ph type="title"/>
+          </p:nvPr>
+        </p:nvSpPr>
+        <p:spPr/>
+        <p:txBody>
+          <a:bodyPr/>
+          <a:lstStyle/>
+          <a:p>
+            <a:r>
+              <a:rPr lang="en-US" dirty="0" smtClean="0"/>
               <a:t>Classes and objects</a:t>
             </a:r>
             <a:endParaRPr lang="en-US" dirty="0"/>
@@ -5052,95 +5732,6 @@
 </p:sld>
 </file>
 
-<file path=ppt/slides/slide2.xml><?xml version="1.0" encoding="utf-8"?>
-<p:sld xmlns:a="http://schemas.openxmlformats.org/drawingml/2006/main" xmlns:r="http://schemas.openxmlformats.org/officeDocument/2006/relationships" xmlns:p="http://schemas.openxmlformats.org/presentationml/2006/main">
-  <p:cSld>
-    <p:spTree>
-      <p:nvGrpSpPr>
-        <p:cNvPr id="1" name=""/>
-        <p:cNvGrpSpPr/>
-        <p:nvPr/>
-      </p:nvGrpSpPr>
-      <p:grpSpPr>
-        <a:xfrm>
-          <a:off x="0" y="0"/>
-          <a:ext cx="0" cy="0"/>
-          <a:chOff x="0" y="0"/>
-          <a:chExt cx="0" cy="0"/>
-        </a:xfrm>
-      </p:grpSpPr>
-      <p:sp>
-        <p:nvSpPr>
-          <p:cNvPr id="2" name="Title 1"/>
-          <p:cNvSpPr>
-            <a:spLocks noGrp="1"/>
-          </p:cNvSpPr>
-          <p:nvPr>
-            <p:ph type="title"/>
-          </p:nvPr>
-        </p:nvSpPr>
-        <p:spPr/>
-        <p:txBody>
-          <a:bodyPr/>
-          <a:lstStyle/>
-          <a:p>
-            <a:r>
-              <a:rPr lang="en-US" dirty="0" smtClean="0"/>
-              <a:t>Begin Chapter 9</a:t>
-            </a:r>
-            <a:endParaRPr lang="en-US" dirty="0"/>
-          </a:p>
-        </p:txBody>
-      </p:sp>
-      <p:sp>
-        <p:nvSpPr>
-          <p:cNvPr id="3" name="Content Placeholder 2"/>
-          <p:cNvSpPr>
-            <a:spLocks noGrp="1"/>
-          </p:cNvSpPr>
-          <p:nvPr>
-            <p:ph idx="1"/>
-          </p:nvPr>
-        </p:nvSpPr>
-        <p:spPr/>
-        <p:txBody>
-          <a:bodyPr/>
-          <a:lstStyle/>
-          <a:p>
-            <a:pPr marL="0" marR="0" lvl="0" indent="0" defTabSz="914400" eaLnBrk="1" fontAlgn="auto" latinLnBrk="0" hangingPunct="1">
-              <a:lnSpc>
-                <a:spcPct val="100000"/>
-              </a:lnSpc>
-              <a:spcBef>
-                <a:spcPts val="0"/>
-              </a:spcBef>
-              <a:spcAft>
-                <a:spcPts val="0"/>
-              </a:spcAft>
-              <a:buClrTx/>
-              <a:buSzTx/>
-              <a:buFontTx/>
-              <a:buNone/>
-              <a:tabLst/>
-              <a:defRPr/>
-            </a:pPr>
-            <a:endParaRPr lang="en-US" dirty="0"/>
-          </a:p>
-        </p:txBody>
-      </p:sp>
-    </p:spTree>
-    <p:extLst>
-      <p:ext uri="{BB962C8B-B14F-4D97-AF65-F5344CB8AC3E}">
-        <p14:creationId xmlns:p14="http://schemas.microsoft.com/office/powerpoint/2010/main" val="1865869954"/>
-      </p:ext>
-    </p:extLst>
-  </p:cSld>
-  <p:clrMapOvr>
-    <a:masterClrMapping/>
-  </p:clrMapOvr>
-</p:sld>
-</file>
-
 <file path=ppt/slides/slide3.xml><?xml version="1.0" encoding="utf-8"?>
 <p:sld xmlns:a="http://schemas.openxmlformats.org/drawingml/2006/main" xmlns:r="http://schemas.openxmlformats.org/officeDocument/2006/relationships" xmlns:p="http://schemas.openxmlformats.org/presentationml/2006/main">
   <p:cSld>
@@ -5175,11 +5766,7 @@
           <a:p>
             <a:r>
               <a:rPr lang="en-US" dirty="0" smtClean="0"/>
-              <a:t>Chapter </a:t>
-            </a:r>
-            <a:r>
-              <a:rPr lang="en-US" dirty="0" smtClean="0"/>
-              <a:t>pre-9 </a:t>
+              <a:t>Chapter pre-9 </a:t>
             </a:r>
             <a:r>
               <a:rPr lang="mr-IN" dirty="0" smtClean="0"/>
@@ -5187,11 +5774,7 @@
             </a:r>
             <a:r>
               <a:rPr lang="en-US" dirty="0" smtClean="0"/>
-              <a:t> </a:t>
-            </a:r>
-            <a:r>
-              <a:rPr lang="en-US" dirty="0" smtClean="0"/>
-              <a:t>quick review</a:t>
+              <a:t> quick review</a:t>
             </a:r>
             <a:endParaRPr lang="en-US" dirty="0"/>
           </a:p>
@@ -5279,11 +5862,6 @@
               </a:rPr>
               <a:t>list, dictionary, tuple</a:t>
             </a:r>
-            <a:endParaRPr lang="en-US" dirty="0" smtClean="0">
-              <a:solidFill>
-                <a:srgbClr val="FF0000"/>
-              </a:solidFill>
-            </a:endParaRPr>
           </a:p>
           <a:p>
             <a:endParaRPr lang="en-US" dirty="0"/>

</xml_diff>